<commit_message>
docs: update test code
</commit_message>
<xml_diff>
--- a/laboratory/pnuskgh/docs/Deep_Learning_002.pptx
+++ b/laboratory/pnuskgh/docs/Deep_Learning_002.pptx
@@ -247,7 +247,7 @@
           <a:p>
             <a:fld id="{E17425D8-D77A-47D9-A78B-1C162B9A78B3}" type="datetimeFigureOut">
               <a:rPr lang="ko-KR" altLang="en-US" smtClean="0"/>
-              <a:t>2023-09-05</a:t>
+              <a:t>2023-09-08</a:t>
             </a:fld>
             <a:endParaRPr lang="ko-KR" altLang="en-US"/>
           </a:p>
@@ -3932,7 +3932,7 @@
         <p:spPr>
           <a:xfrm>
             <a:off x="344487" y="1412776"/>
-            <a:ext cx="9217025" cy="338554"/>
+            <a:ext cx="9217025" cy="1151084"/>
           </a:xfrm>
           <a:prstGeom prst="rect">
             <a:avLst/>
@@ -4086,6 +4086,29 @@
               </a:rPr>
               <a:t>Transformer</a:t>
             </a:r>
+          </a:p>
+          <a:p>
+            <a:pPr lvl="1"/>
+            <a:r>
+              <a:rPr lang="en-US" altLang="ko-KR" sz="1400">
+                <a:latin typeface="+mn-ea"/>
+              </a:rPr>
+              <a:t>Encoder : I am a [mask]. -&gt; I am a boy.</a:t>
+            </a:r>
+          </a:p>
+          <a:p>
+            <a:pPr lvl="1"/>
+            <a:r>
+              <a:rPr lang="en-US" altLang="ko-KR" sz="1400">
+                <a:latin typeface="+mn-ea"/>
+              </a:rPr>
+              <a:t>Decoder : I am a boy. -&gt; You are girl.</a:t>
+            </a:r>
+          </a:p>
+          <a:p>
+            <a:endParaRPr lang="en-US" altLang="ko-KR" sz="1600">
+              <a:latin typeface="+mn-ea"/>
+            </a:endParaRPr>
           </a:p>
         </p:txBody>
       </p:sp>
@@ -7819,7 +7842,19 @@
               <a:rPr lang="en-US" altLang="ko-KR" sz="1600">
                 <a:latin typeface="+mn-ea"/>
               </a:rPr>
-              <a:t>Contrastive Learning</a:t>
+              <a:t>Contrastive Learning (</a:t>
+            </a:r>
+            <a:r>
+              <a:rPr lang="ko-KR" altLang="en-US" sz="1600">
+                <a:latin typeface="+mn-ea"/>
+              </a:rPr>
+              <a:t>대조 러닝</a:t>
+            </a:r>
+            <a:r>
+              <a:rPr lang="en-US" altLang="ko-KR" sz="1600">
+                <a:latin typeface="+mn-ea"/>
+              </a:rPr>
+              <a:t>)</a:t>
             </a:r>
           </a:p>
           <a:p>
@@ -8088,7 +8123,7 @@
         <p:spPr>
           <a:xfrm>
             <a:off x="344488" y="1412776"/>
-            <a:ext cx="9180880" cy="338554"/>
+            <a:ext cx="9180880" cy="892552"/>
           </a:xfrm>
           <a:prstGeom prst="rect">
             <a:avLst/>
@@ -8242,6 +8277,23 @@
               </a:rPr>
               <a:t>PrefixLM</a:t>
             </a:r>
+          </a:p>
+          <a:p>
+            <a:pPr lvl="1"/>
+            <a:r>
+              <a:rPr lang="ko-KR" altLang="en-US" sz="1400">
+                <a:latin typeface="+mn-ea"/>
+              </a:rPr>
+              <a:t>입력 텍스트로 다음 텍스트를 예측</a:t>
+            </a:r>
+            <a:endParaRPr lang="en-US" altLang="ko-KR" sz="1400">
+              <a:latin typeface="+mn-ea"/>
+            </a:endParaRPr>
+          </a:p>
+          <a:p>
+            <a:endParaRPr lang="en-US" altLang="ko-KR" sz="1600">
+              <a:latin typeface="+mn-ea"/>
+            </a:endParaRPr>
           </a:p>
         </p:txBody>
       </p:sp>
@@ -8539,7 +8591,7 @@
         <p:spPr>
           <a:xfrm>
             <a:off x="344488" y="1412776"/>
-            <a:ext cx="9180880" cy="338554"/>
+            <a:ext cx="9180880" cy="1151084"/>
           </a:xfrm>
           <a:prstGeom prst="rect">
             <a:avLst/>
@@ -8694,6 +8746,65 @@
               <a:t>Frozen PrefixLM</a:t>
             </a:r>
           </a:p>
+          <a:p>
+            <a:pPr lvl="1"/>
+            <a:r>
+              <a:rPr lang="ko-KR" altLang="en-US" sz="1400">
+                <a:latin typeface="+mn-ea"/>
+              </a:rPr>
+              <a:t>사전 훈련된 언어 모델 </a:t>
+            </a:r>
+            <a:r>
+              <a:rPr lang="en-US" altLang="ko-KR" sz="1400">
+                <a:latin typeface="+mn-ea"/>
+              </a:rPr>
+              <a:t>(Frozen </a:t>
+            </a:r>
+            <a:r>
+              <a:rPr lang="ko-KR" altLang="en-US" sz="1400">
+                <a:latin typeface="+mn-ea"/>
+              </a:rPr>
+              <a:t>됨</a:t>
+            </a:r>
+            <a:r>
+              <a:rPr lang="en-US" altLang="ko-KR" sz="1400">
+                <a:latin typeface="+mn-ea"/>
+              </a:rPr>
+              <a:t>)</a:t>
+            </a:r>
+            <a:r>
+              <a:rPr lang="ko-KR" altLang="en-US" sz="1400">
+                <a:latin typeface="+mn-ea"/>
+              </a:rPr>
+              <a:t>을 사용하여 학습</a:t>
+            </a:r>
+            <a:endParaRPr lang="en-US" altLang="ko-KR" sz="1400">
+              <a:latin typeface="+mn-ea"/>
+            </a:endParaRPr>
+          </a:p>
+          <a:p>
+            <a:pPr lvl="1"/>
+            <a:r>
+              <a:rPr lang="en-US" altLang="ko-KR" sz="1400">
+                <a:latin typeface="+mn-ea"/>
+              </a:rPr>
+              <a:t>Vision Encoder</a:t>
+            </a:r>
+            <a:r>
+              <a:rPr lang="ko-KR" altLang="en-US" sz="1400">
+                <a:latin typeface="+mn-ea"/>
+              </a:rPr>
+              <a:t>만 학습됨</a:t>
+            </a:r>
+            <a:endParaRPr lang="en-US" altLang="ko-KR" sz="1400">
+              <a:latin typeface="+mn-ea"/>
+            </a:endParaRPr>
+          </a:p>
+          <a:p>
+            <a:endParaRPr lang="en-US" altLang="ko-KR" sz="1600">
+              <a:latin typeface="+mn-ea"/>
+            </a:endParaRPr>
+          </a:p>
         </p:txBody>
       </p:sp>
       <p:sp>
@@ -8710,7 +8821,7 @@
         </p:nvSpPr>
         <p:spPr>
           <a:xfrm>
-            <a:off x="748205" y="5651817"/>
+            <a:off x="748205" y="6135107"/>
             <a:ext cx="6192590" cy="246221"/>
           </a:xfrm>
           <a:prstGeom prst="rect">
@@ -8789,7 +8900,7 @@
         </p:blipFill>
         <p:spPr bwMode="auto">
           <a:xfrm>
-            <a:off x="776535" y="1751330"/>
+            <a:off x="776535" y="2234620"/>
             <a:ext cx="8856985" cy="3900487"/>
           </a:xfrm>
           <a:prstGeom prst="rect">
@@ -9470,7 +9581,7 @@
         <p:spPr>
           <a:xfrm>
             <a:off x="344488" y="1412776"/>
-            <a:ext cx="9180880" cy="1151084"/>
+            <a:ext cx="9180880" cy="1668149"/>
           </a:xfrm>
           <a:prstGeom prst="rect">
             <a:avLst/>
@@ -9658,20 +9769,41 @@
           <a:p>
             <a:pPr lvl="1"/>
             <a:r>
-              <a:rPr lang="en-US" altLang="ko-KR" sz="1400">
-                <a:latin typeface="+mn-ea"/>
-              </a:rPr>
-              <a:t>VisualBERT, FLAVA, ViLBERT, LXMERT, BridgeTower </a:t>
-            </a:r>
-            <a:r>
               <a:rPr lang="ko-KR" altLang="en-US" sz="1400">
                 <a:latin typeface="+mn-ea"/>
               </a:rPr>
-              <a:t>등</a:t>
+              <a:t>이미지의 특징 부분을 텍스트와 정렬한 후 학습</a:t>
             </a:r>
             <a:endParaRPr lang="en-US" altLang="ko-KR" sz="1400">
               <a:latin typeface="+mn-ea"/>
             </a:endParaRPr>
+          </a:p>
+          <a:p>
+            <a:pPr lvl="1"/>
+            <a:r>
+              <a:rPr lang="en-US" altLang="ko-KR" sz="1400">
+                <a:latin typeface="+mn-ea"/>
+              </a:rPr>
+              <a:t>VisualBERT, FLAVA, ViLBERT, LXMERT, BridgeTower </a:t>
+            </a:r>
+            <a:r>
+              <a:rPr lang="ko-KR" altLang="en-US" sz="1400">
+                <a:latin typeface="+mn-ea"/>
+              </a:rPr>
+              <a:t>등</a:t>
+            </a:r>
+            <a:endParaRPr lang="en-US" altLang="ko-KR" sz="1400">
+              <a:latin typeface="+mn-ea"/>
+            </a:endParaRPr>
+          </a:p>
+          <a:p>
+            <a:pPr lvl="1"/>
+            <a:r>
+              <a:rPr lang="en-US" altLang="ko-KR" sz="1400">
+                <a:latin typeface="+mn-ea"/>
+              </a:rPr>
+              <a:t>TRM (Trasformer Module)</a:t>
+            </a:r>
           </a:p>
           <a:p>
             <a:endParaRPr lang="en-US" altLang="ko-KR" sz="1600">
@@ -9694,7 +9826,7 @@
         </p:nvSpPr>
         <p:spPr>
           <a:xfrm>
-            <a:off x="776535" y="4478923"/>
+            <a:off x="776535" y="5126995"/>
             <a:ext cx="6192590" cy="246221"/>
           </a:xfrm>
           <a:prstGeom prst="rect">
@@ -9773,7 +9905,7 @@
         </p:blipFill>
         <p:spPr bwMode="auto">
           <a:xfrm>
-            <a:off x="560512" y="2398537"/>
+            <a:off x="560512" y="3046609"/>
             <a:ext cx="9001001" cy="2036763"/>
           </a:xfrm>
           <a:prstGeom prst="rect">
@@ -9791,6 +9923,117 @@
           </a:extLst>
         </p:spPr>
       </p:pic>
+      <p:pic>
+        <p:nvPicPr>
+          <p:cNvPr id="1030" name="Picture 6" descr="Masked Language Model | Understanding Masked Language Models (MLM) and Causal Language Models (CLM) in NLP | Language Models in NLP (Visuals and Examples)">
+            <a:extLst>
+              <a:ext uri="{FF2B5EF4-FFF2-40B4-BE49-F238E27FC236}">
+                <a16:creationId xmlns:a16="http://schemas.microsoft.com/office/drawing/2014/main" id="{8F732258-E4CE-9CEB-708A-D227D94CC13D}"/>
+              </a:ext>
+            </a:extLst>
+          </p:cNvPr>
+          <p:cNvPicPr>
+            <a:picLocks noChangeAspect="1" noChangeArrowheads="1"/>
+          </p:cNvPicPr>
+          <p:nvPr/>
+        </p:nvPicPr>
+        <p:blipFill>
+          <a:blip r:embed="rId4">
+            <a:extLst>
+              <a:ext uri="{28A0092B-C50C-407E-A947-70E740481C1C}">
+                <a14:useLocalDpi xmlns:a14="http://schemas.microsoft.com/office/drawing/2010/main" val="0"/>
+              </a:ext>
+            </a:extLst>
+          </a:blip>
+          <a:srcRect/>
+          <a:stretch>
+            <a:fillRect/>
+          </a:stretch>
+        </p:blipFill>
+        <p:spPr bwMode="auto">
+          <a:xfrm>
+            <a:off x="7377435" y="764704"/>
+            <a:ext cx="2184077" cy="1591012"/>
+          </a:xfrm>
+          <a:prstGeom prst="rect">
+            <a:avLst/>
+          </a:prstGeom>
+          <a:noFill/>
+          <a:extLst>
+            <a:ext uri="{909E8E84-426E-40DD-AFC4-6F175D3DCCD1}">
+              <a14:hiddenFill xmlns:a14="http://schemas.microsoft.com/office/drawing/2010/main">
+                <a:solidFill>
+                  <a:srgbClr val="FFFFFF"/>
+                </a:solidFill>
+              </a14:hiddenFill>
+            </a:ext>
+          </a:extLst>
+        </p:spPr>
+      </p:pic>
+      <p:sp>
+        <p:nvSpPr>
+          <p:cNvPr id="6" name="TextBox 5">
+            <a:extLst>
+              <a:ext uri="{FF2B5EF4-FFF2-40B4-BE49-F238E27FC236}">
+                <a16:creationId xmlns:a16="http://schemas.microsoft.com/office/drawing/2014/main" id="{8128E723-BAAF-E311-68FA-4D8A8AB5D0D4}"/>
+              </a:ext>
+            </a:extLst>
+          </p:cNvPr>
+          <p:cNvSpPr txBox="1"/>
+          <p:nvPr/>
+        </p:nvSpPr>
+        <p:spPr>
+          <a:xfrm>
+            <a:off x="6105128" y="2411100"/>
+            <a:ext cx="3456384" cy="553998"/>
+          </a:xfrm>
+          <a:prstGeom prst="rect">
+            <a:avLst/>
+          </a:prstGeom>
+          <a:noFill/>
+        </p:spPr>
+        <p:txBody>
+          <a:bodyPr wrap="square" rtlCol="0">
+            <a:spAutoFit/>
+          </a:bodyPr>
+          <a:lstStyle/>
+          <a:p>
+            <a:r>
+              <a:rPr lang="ko-KR" altLang="en-US" sz="1000">
+                <a:solidFill>
+                  <a:schemeClr val="tx1">
+                    <a:lumMod val="50000"/>
+                    <a:lumOff val="50000"/>
+                  </a:schemeClr>
+                </a:solidFill>
+                <a:latin typeface="+mn-ea"/>
+              </a:rPr>
+              <a:t>출처</a:t>
+            </a:r>
+            <a:r>
+              <a:rPr lang="en-US" altLang="ko-KR" sz="1000">
+                <a:solidFill>
+                  <a:schemeClr val="tx1">
+                    <a:lumMod val="50000"/>
+                    <a:lumOff val="50000"/>
+                  </a:schemeClr>
+                </a:solidFill>
+                <a:latin typeface="+mn-ea"/>
+              </a:rPr>
+              <a:t>: https://towardsdatascience.com/understanding-masked-language-models-mlm-and-causal-language-models-clm-in-nlp-194c15f56a5</a:t>
+            </a:r>
+            <a:endParaRPr lang="ko-KR" altLang="en-US" sz="1000">
+              <a:solidFill>
+                <a:schemeClr val="tx1">
+                  <a:lumMod val="50000"/>
+                  <a:lumOff val="50000"/>
+                </a:schemeClr>
+              </a:solidFill>
+              <a:latin typeface="+mn-ea"/>
+            </a:endParaRPr>
+          </a:p>
+        </p:txBody>
+      </p:sp>
     </p:spTree>
     <p:extLst>
       <p:ext uri="{BB962C8B-B14F-4D97-AF65-F5344CB8AC3E}">

</xml_diff>